<commit_message>
Visualisation of simulations & mcmc results
Visualisation of simulations & mcmc results
</commit_message>
<xml_diff>
--- a/Mathematical_Models/cdt_presentation_thurs_july_8th.pptx
+++ b/Mathematical_Models/cdt_presentation_thurs_july_8th.pptx
@@ -5,7 +5,7 @@
     <p:sldMasterId id="2147483731" r:id="rId1"/>
   </p:sldMasterIdLst>
   <p:notesMasterIdLst>
-    <p:notesMasterId r:id="rId16"/>
+    <p:notesMasterId r:id="rId17"/>
   </p:notesMasterIdLst>
   <p:sldIdLst>
     <p:sldId id="256" r:id="rId2"/>
@@ -18,10 +18,11 @@
     <p:sldId id="289" r:id="rId9"/>
     <p:sldId id="299" r:id="rId10"/>
     <p:sldId id="298" r:id="rId11"/>
-    <p:sldId id="293" r:id="rId12"/>
-    <p:sldId id="297" r:id="rId13"/>
-    <p:sldId id="288" r:id="rId14"/>
-    <p:sldId id="301" r:id="rId15"/>
+    <p:sldId id="303" r:id="rId12"/>
+    <p:sldId id="293" r:id="rId13"/>
+    <p:sldId id="297" r:id="rId14"/>
+    <p:sldId id="288" r:id="rId15"/>
+    <p:sldId id="301" r:id="rId16"/>
   </p:sldIdLst>
   <p:sldSz cx="12192000" cy="6858000"/>
   <p:notesSz cx="6858000" cy="9144000"/>
@@ -210,7 +211,7 @@
           <a:p>
             <a:fld id="{8F7E32F0-930A-44E6-8941-235E88E9C716}" type="datetimeFigureOut">
               <a:rPr lang="en-IE" smtClean="0"/>
-              <a:t>14/07/2021</a:t>
+              <a:t>03/08/2021</a:t>
             </a:fld>
             <a:endParaRPr lang="en-IE"/>
           </a:p>
@@ -715,7 +716,7 @@
           <a:p>
             <a:fld id="{C697B097-996D-432D-9C37-1E937D04D218}" type="datetimeFigureOut">
               <a:rPr lang="en-IE" smtClean="0"/>
-              <a:t>14/07/2021</a:t>
+              <a:t>03/08/2021</a:t>
             </a:fld>
             <a:endParaRPr lang="en-IE"/>
           </a:p>
@@ -885,7 +886,7 @@
           <a:p>
             <a:fld id="{C697B097-996D-432D-9C37-1E937D04D218}" type="datetimeFigureOut">
               <a:rPr lang="en-IE" smtClean="0"/>
-              <a:t>14/07/2021</a:t>
+              <a:t>03/08/2021</a:t>
             </a:fld>
             <a:endParaRPr lang="en-IE"/>
           </a:p>
@@ -1065,7 +1066,7 @@
           <a:p>
             <a:fld id="{C697B097-996D-432D-9C37-1E937D04D218}" type="datetimeFigureOut">
               <a:rPr lang="en-IE" smtClean="0"/>
-              <a:t>14/07/2021</a:t>
+              <a:t>03/08/2021</a:t>
             </a:fld>
             <a:endParaRPr lang="en-IE"/>
           </a:p>
@@ -1255,7 +1256,7 @@
           <a:p>
             <a:fld id="{C697B097-996D-432D-9C37-1E937D04D218}" type="datetimeFigureOut">
               <a:rPr lang="en-IE" smtClean="0"/>
-              <a:t>14/07/2021</a:t>
+              <a:t>03/08/2021</a:t>
             </a:fld>
             <a:endParaRPr lang="en-IE"/>
           </a:p>
@@ -1501,7 +1502,7 @@
           <a:p>
             <a:fld id="{C697B097-996D-432D-9C37-1E937D04D218}" type="datetimeFigureOut">
               <a:rPr lang="en-IE" smtClean="0"/>
-              <a:t>14/07/2021</a:t>
+              <a:t>03/08/2021</a:t>
             </a:fld>
             <a:endParaRPr lang="en-IE"/>
           </a:p>
@@ -1733,7 +1734,7 @@
           <a:p>
             <a:fld id="{C697B097-996D-432D-9C37-1E937D04D218}" type="datetimeFigureOut">
               <a:rPr lang="en-IE" smtClean="0"/>
-              <a:t>14/07/2021</a:t>
+              <a:t>03/08/2021</a:t>
             </a:fld>
             <a:endParaRPr lang="en-IE"/>
           </a:p>
@@ -2100,7 +2101,7 @@
           <a:p>
             <a:fld id="{C697B097-996D-432D-9C37-1E937D04D218}" type="datetimeFigureOut">
               <a:rPr lang="en-IE" smtClean="0"/>
-              <a:t>14/07/2021</a:t>
+              <a:t>03/08/2021</a:t>
             </a:fld>
             <a:endParaRPr lang="en-IE"/>
           </a:p>
@@ -2218,7 +2219,7 @@
           <a:p>
             <a:fld id="{C697B097-996D-432D-9C37-1E937D04D218}" type="datetimeFigureOut">
               <a:rPr lang="en-IE" smtClean="0"/>
-              <a:t>14/07/2021</a:t>
+              <a:t>03/08/2021</a:t>
             </a:fld>
             <a:endParaRPr lang="en-IE"/>
           </a:p>
@@ -2313,7 +2314,7 @@
           <a:p>
             <a:fld id="{C697B097-996D-432D-9C37-1E937D04D218}" type="datetimeFigureOut">
               <a:rPr lang="en-IE" smtClean="0"/>
-              <a:t>14/07/2021</a:t>
+              <a:t>03/08/2021</a:t>
             </a:fld>
             <a:endParaRPr lang="en-IE"/>
           </a:p>
@@ -2590,7 +2591,7 @@
           <a:p>
             <a:fld id="{C697B097-996D-432D-9C37-1E937D04D218}" type="datetimeFigureOut">
               <a:rPr lang="en-IE" smtClean="0"/>
-              <a:t>14/07/2021</a:t>
+              <a:t>03/08/2021</a:t>
             </a:fld>
             <a:endParaRPr lang="en-IE"/>
           </a:p>
@@ -2843,7 +2844,7 @@
           <a:p>
             <a:fld id="{C697B097-996D-432D-9C37-1E937D04D218}" type="datetimeFigureOut">
               <a:rPr lang="en-IE" smtClean="0"/>
-              <a:t>14/07/2021</a:t>
+              <a:t>03/08/2021</a:t>
             </a:fld>
             <a:endParaRPr lang="en-IE"/>
           </a:p>
@@ -3056,7 +3057,7 @@
           <a:p>
             <a:fld id="{C697B097-996D-432D-9C37-1E937D04D218}" type="datetimeFigureOut">
               <a:rPr lang="en-IE" smtClean="0"/>
-              <a:t>14/07/2021</a:t>
+              <a:t>03/08/2021</a:t>
             </a:fld>
             <a:endParaRPr lang="en-IE"/>
           </a:p>
@@ -3941,6 +3942,370 @@
         </p:nvSpPr>
         <p:spPr>
           <a:xfrm>
+            <a:off x="700147" y="172940"/>
+            <a:ext cx="10226950" cy="1104153"/>
+          </a:xfrm>
+        </p:spPr>
+        <p:txBody>
+          <a:bodyPr>
+            <a:normAutofit/>
+          </a:bodyPr>
+          <a:lstStyle/>
+          <a:p>
+            <a:r>
+              <a:rPr lang="en-IE" sz="3000" dirty="0" smtClean="0"/>
+              <a:t>Results - Adaptive </a:t>
+            </a:r>
+            <a:r>
+              <a:rPr lang="en-IE" sz="3000" dirty="0" smtClean="0"/>
+              <a:t>Scaling Monte </a:t>
+            </a:r>
+            <a:r>
+              <a:rPr lang="en-IE" sz="3000" dirty="0" smtClean="0"/>
+              <a:t>Carlo</a:t>
+            </a:r>
+            <a:endParaRPr lang="en-IE" sz="3000" dirty="0"/>
+          </a:p>
+        </p:txBody>
+      </p:sp>
+      <mc:AlternateContent xmlns:mc="http://schemas.openxmlformats.org/markup-compatibility/2006" xmlns:a14="http://schemas.microsoft.com/office/drawing/2010/main">
+        <mc:Choice Requires="a14">
+          <p:sp>
+            <p:nvSpPr>
+              <p:cNvPr id="11" name="TextBox 10"/>
+              <p:cNvSpPr txBox="1"/>
+              <p:nvPr/>
+            </p:nvSpPr>
+            <p:spPr>
+              <a:xfrm>
+                <a:off x="4604356" y="1155491"/>
+                <a:ext cx="3806721" cy="430887"/>
+              </a:xfrm>
+              <a:prstGeom prst="rect">
+                <a:avLst/>
+              </a:prstGeom>
+              <a:noFill/>
+            </p:spPr>
+            <p:txBody>
+              <a:bodyPr wrap="square" rtlCol="0">
+                <a:spAutoFit/>
+              </a:bodyPr>
+              <a:lstStyle/>
+              <a:p>
+                <a:pPr algn="ctr"/>
+                <a14:m>
+                  <m:oMath xmlns:m="http://schemas.openxmlformats.org/officeDocument/2006/math">
+                    <m:sSub>
+                      <m:sSubPr>
+                        <m:ctrlPr>
+                          <a:rPr lang="en-IE" sz="2200" b="1" i="1" smtClean="0">
+                            <a:solidFill>
+                              <a:srgbClr val="FFC000"/>
+                            </a:solidFill>
+                            <a:latin typeface="Cambria Math" panose="02040503050406030204" pitchFamily="18" charset="0"/>
+                          </a:rPr>
+                        </m:ctrlPr>
+                      </m:sSubPr>
+                      <m:e>
+                        <m:r>
+                          <a:rPr lang="en-IE" sz="2200" b="1" i="1" smtClean="0">
+                            <a:solidFill>
+                              <a:srgbClr val="FFC000"/>
+                            </a:solidFill>
+                            <a:latin typeface="Cambria Math" panose="02040503050406030204" pitchFamily="18" charset="0"/>
+                          </a:rPr>
+                          <m:t>𝑹</m:t>
+                        </m:r>
+                      </m:e>
+                      <m:sub>
+                        <m:r>
+                          <a:rPr lang="en-IE" sz="2200" b="1" i="1" smtClean="0">
+                            <a:solidFill>
+                              <a:srgbClr val="FFC000"/>
+                            </a:solidFill>
+                            <a:latin typeface="Cambria Math" panose="02040503050406030204" pitchFamily="18" charset="0"/>
+                          </a:rPr>
+                          <m:t>𝟎</m:t>
+                        </m:r>
+                      </m:sub>
+                    </m:sSub>
+                  </m:oMath>
+                </a14:m>
+                <a:r>
+                  <a:rPr lang="en-IE" sz="2200" b="1" dirty="0" smtClean="0">
+                    <a:solidFill>
+                      <a:srgbClr val="FFC000"/>
+                    </a:solidFill>
+                  </a:rPr>
+                  <a:t> of simulated data = 3.5 </a:t>
+                </a:r>
+                <a:endParaRPr lang="en-IE" sz="2200" b="1" dirty="0">
+                  <a:solidFill>
+                    <a:srgbClr val="FFC000"/>
+                  </a:solidFill>
+                </a:endParaRPr>
+              </a:p>
+            </p:txBody>
+          </p:sp>
+        </mc:Choice>
+        <mc:Fallback xmlns="">
+          <p:sp>
+            <p:nvSpPr>
+              <p:cNvPr id="11" name="TextBox 10"/>
+              <p:cNvSpPr txBox="1">
+                <a:spLocks noRot="1" noChangeAspect="1" noMove="1" noResize="1" noEditPoints="1" noAdjustHandles="1" noChangeArrowheads="1" noChangeShapeType="1" noTextEdit="1"/>
+              </p:cNvSpPr>
+              <p:nvPr/>
+            </p:nvSpPr>
+            <p:spPr>
+              <a:xfrm>
+                <a:off x="4604356" y="1155491"/>
+                <a:ext cx="3806721" cy="430887"/>
+              </a:xfrm>
+              <a:prstGeom prst="rect">
+                <a:avLst/>
+              </a:prstGeom>
+              <a:blipFill>
+                <a:blip r:embed="rId6"/>
+                <a:stretch>
+                  <a:fillRect t="-10000" b="-28571"/>
+                </a:stretch>
+              </a:blipFill>
+            </p:spPr>
+            <p:txBody>
+              <a:bodyPr/>
+              <a:lstStyle/>
+              <a:p>
+                <a:r>
+                  <a:rPr lang="en-IE">
+                    <a:noFill/>
+                  </a:rPr>
+                  <a:t> </a:t>
+                </a:r>
+              </a:p>
+            </p:txBody>
+          </p:sp>
+        </mc:Fallback>
+      </mc:AlternateContent>
+      <p:pic>
+        <p:nvPicPr>
+          <p:cNvPr id="12" name="Picture 11"/>
+          <p:cNvPicPr>
+            <a:picLocks noChangeAspect="1"/>
+          </p:cNvPicPr>
+          <p:nvPr/>
+        </p:nvPicPr>
+        <p:blipFill>
+          <a:blip r:embed="rId7"/>
+          <a:stretch>
+            <a:fillRect/>
+          </a:stretch>
+        </p:blipFill>
+        <p:spPr>
+          <a:xfrm>
+            <a:off x="135889" y="2326551"/>
+            <a:ext cx="3132543" cy="2622293"/>
+          </a:xfrm>
+          <a:prstGeom prst="rect">
+            <a:avLst/>
+          </a:prstGeom>
+        </p:spPr>
+      </p:pic>
+      <p:sp>
+        <p:nvSpPr>
+          <p:cNvPr id="9" name="Rectangle 8"/>
+          <p:cNvSpPr/>
+          <p:nvPr/>
+        </p:nvSpPr>
+        <p:spPr>
+          <a:xfrm>
+            <a:off x="135889" y="4117572"/>
+            <a:ext cx="3163818" cy="133004"/>
+          </a:xfrm>
+          <a:prstGeom prst="rect">
+            <a:avLst/>
+          </a:prstGeom>
+          <a:noFill/>
+          <a:ln w="19050">
+            <a:solidFill>
+              <a:srgbClr val="FFC000"/>
+            </a:solidFill>
+          </a:ln>
+        </p:spPr>
+        <p:style>
+          <a:lnRef idx="2">
+            <a:schemeClr val="accent1">
+              <a:shade val="50000"/>
+            </a:schemeClr>
+          </a:lnRef>
+          <a:fillRef idx="1">
+            <a:schemeClr val="accent1"/>
+          </a:fillRef>
+          <a:effectRef idx="0">
+            <a:schemeClr val="accent1"/>
+          </a:effectRef>
+          <a:fontRef idx="minor">
+            <a:schemeClr val="lt1"/>
+          </a:fontRef>
+        </p:style>
+        <p:txBody>
+          <a:bodyPr rtlCol="0" anchor="ctr"/>
+          <a:lstStyle/>
+          <a:p>
+            <a:pPr algn="ctr"/>
+            <a:endParaRPr lang="en-IE">
+              <a:solidFill>
+                <a:srgbClr val="FFC000"/>
+              </a:solidFill>
+            </a:endParaRPr>
+          </a:p>
+        </p:txBody>
+      </p:sp>
+      <p:pic>
+        <p:nvPicPr>
+          <p:cNvPr id="5" name="Picture 4"/>
+          <p:cNvPicPr>
+            <a:picLocks noChangeAspect="1"/>
+          </p:cNvPicPr>
+          <p:nvPr/>
+        </p:nvPicPr>
+        <p:blipFill>
+          <a:blip r:embed="rId8"/>
+          <a:stretch>
+            <a:fillRect/>
+          </a:stretch>
+        </p:blipFill>
+        <p:spPr>
+          <a:xfrm>
+            <a:off x="3772599" y="1687484"/>
+            <a:ext cx="4882097" cy="4860176"/>
+          </a:xfrm>
+          <a:prstGeom prst="rect">
+            <a:avLst/>
+          </a:prstGeom>
+        </p:spPr>
+      </p:pic>
+      <p:pic>
+        <p:nvPicPr>
+          <p:cNvPr id="6" name="Picture 5"/>
+          <p:cNvPicPr>
+            <a:picLocks noChangeAspect="1"/>
+          </p:cNvPicPr>
+          <p:nvPr/>
+        </p:nvPicPr>
+        <p:blipFill>
+          <a:blip r:embed="rId9"/>
+          <a:stretch>
+            <a:fillRect/>
+          </a:stretch>
+        </p:blipFill>
+        <p:spPr>
+          <a:xfrm>
+            <a:off x="8962702" y="911412"/>
+            <a:ext cx="2688783" cy="2668101"/>
+          </a:xfrm>
+          <a:prstGeom prst="rect">
+            <a:avLst/>
+          </a:prstGeom>
+        </p:spPr>
+      </p:pic>
+      <p:pic>
+        <p:nvPicPr>
+          <p:cNvPr id="16" name="Picture 15"/>
+          <p:cNvPicPr>
+            <a:picLocks noChangeAspect="1"/>
+          </p:cNvPicPr>
+          <p:nvPr/>
+        </p:nvPicPr>
+        <p:blipFill>
+          <a:blip r:embed="rId10"/>
+          <a:stretch>
+            <a:fillRect/>
+          </a:stretch>
+        </p:blipFill>
+        <p:spPr>
+          <a:xfrm>
+            <a:off x="8962702" y="3579513"/>
+            <a:ext cx="2711883" cy="2787013"/>
+          </a:xfrm>
+          <a:prstGeom prst="rect">
+            <a:avLst/>
+          </a:prstGeom>
+        </p:spPr>
+      </p:pic>
+      <p:pic>
+        <p:nvPicPr>
+          <p:cNvPr id="3" name="Picture 2"/>
+          <p:cNvPicPr>
+            <a:picLocks noChangeAspect="1"/>
+          </p:cNvPicPr>
+          <p:nvPr/>
+        </p:nvPicPr>
+        <p:blipFill>
+          <a:blip r:embed="rId11"/>
+          <a:stretch>
+            <a:fillRect/>
+          </a:stretch>
+        </p:blipFill>
+        <p:spPr>
+          <a:xfrm>
+            <a:off x="-1932214" y="1370934"/>
+            <a:ext cx="6124010" cy="4907319"/>
+          </a:xfrm>
+          <a:prstGeom prst="rect">
+            <a:avLst/>
+          </a:prstGeom>
+        </p:spPr>
+      </p:pic>
+    </p:spTree>
+    <p:extLst>
+      <p:ext uri="{BB962C8B-B14F-4D97-AF65-F5344CB8AC3E}">
+        <p14:creationId xmlns:p14="http://schemas.microsoft.com/office/powerpoint/2010/main" val="729019392"/>
+      </p:ext>
+    </p:extLst>
+  </p:cSld>
+  <p:clrMapOvr>
+    <a:masterClrMapping/>
+  </p:clrMapOvr>
+  <p:timing>
+    <p:tnLst>
+      <p:par>
+        <p:cTn id="1" dur="indefinite" restart="never" nodeType="tmRoot"/>
+      </p:par>
+    </p:tnLst>
+  </p:timing>
+</p:sld>
+</file>
+
+<file path=ppt/slides/slide12.xml><?xml version="1.0" encoding="utf-8"?>
+<p:sld xmlns:a="http://schemas.openxmlformats.org/drawingml/2006/main" xmlns:r="http://schemas.openxmlformats.org/officeDocument/2006/relationships" xmlns:p="http://schemas.openxmlformats.org/presentationml/2006/main">
+  <p:cSld>
+    <p:spTree>
+      <p:nvGrpSpPr>
+        <p:cNvPr id="1" name=""/>
+        <p:cNvGrpSpPr/>
+        <p:nvPr/>
+      </p:nvGrpSpPr>
+      <p:grpSpPr>
+        <a:xfrm>
+          <a:off x="0" y="0"/>
+          <a:ext cx="0" cy="0"/>
+          <a:chOff x="0" y="0"/>
+          <a:chExt cx="0" cy="0"/>
+        </a:xfrm>
+      </p:grpSpPr>
+      <p:sp>
+        <p:nvSpPr>
+          <p:cNvPr id="2" name="Title 1"/>
+          <p:cNvSpPr>
+            <a:spLocks noGrp="1"/>
+          </p:cNvSpPr>
+          <p:nvPr>
+            <p:ph type="title"/>
+          </p:nvPr>
+        </p:nvSpPr>
+        <p:spPr>
+          <a:xfrm>
             <a:off x="537556" y="332914"/>
             <a:ext cx="10515600" cy="1065320"/>
           </a:xfrm>
@@ -4049,7 +4414,7 @@
 </p:sld>
 </file>
 
-<file path=ppt/slides/slide12.xml><?xml version="1.0" encoding="utf-8"?>
+<file path=ppt/slides/slide13.xml><?xml version="1.0" encoding="utf-8"?>
 <p:sld xmlns:a="http://schemas.openxmlformats.org/drawingml/2006/main" xmlns:r="http://schemas.openxmlformats.org/officeDocument/2006/relationships" xmlns:p="http://schemas.openxmlformats.org/presentationml/2006/main">
   <p:cSld>
     <p:spTree>
@@ -4193,7 +4558,7 @@
 </p:sld>
 </file>
 
-<file path=ppt/slides/slide13.xml><?xml version="1.0" encoding="utf-8"?>
+<file path=ppt/slides/slide14.xml><?xml version="1.0" encoding="utf-8"?>
 <p:sld xmlns:a="http://schemas.openxmlformats.org/drawingml/2006/main" xmlns:r="http://schemas.openxmlformats.org/officeDocument/2006/relationships" xmlns:p="http://schemas.openxmlformats.org/presentationml/2006/main">
   <p:cSld>
     <p:spTree>
@@ -4300,7 +4665,7 @@
 </p:sld>
 </file>
 
-<file path=ppt/slides/slide14.xml><?xml version="1.0" encoding="utf-8"?>
+<file path=ppt/slides/slide15.xml><?xml version="1.0" encoding="utf-8"?>
 <p:sld xmlns:a="http://schemas.openxmlformats.org/drawingml/2006/main" xmlns:r="http://schemas.openxmlformats.org/officeDocument/2006/relationships" xmlns:p="http://schemas.openxmlformats.org/presentationml/2006/main">
   <p:cSld>
     <p:spTree>
@@ -4690,8 +5055,8 @@
           </a:p>
         </p:txBody>
       </p:sp>
-      <mc:AlternateContent xmlns:mc="http://schemas.openxmlformats.org/markup-compatibility/2006" xmlns:a14="http://schemas.microsoft.com/office/drawing/2010/main">
-        <mc:Choice Requires="a14">
+      <mc:AlternateContent xmlns:mc="http://schemas.openxmlformats.org/markup-compatibility/2006">
+        <mc:Choice xmlns:a14="http://schemas.microsoft.com/office/drawing/2010/main" Requires="a14">
           <p:sp>
             <p:nvSpPr>
               <p:cNvPr id="3" name="Content Placeholder 2"/>
@@ -4758,8 +5123,17 @@
                 </a14:m>
                 <a:r>
                   <a:rPr lang="en-IE" dirty="0" smtClean="0"/>
-                  <a:t>  = Number of infected in the epidemic</a:t>
+                  <a:t>  = Number of infected in the </a:t>
                 </a:r>
+                <a:r>
+                  <a:rPr lang="en-IE" dirty="0" smtClean="0"/>
+                  <a:t>epidemic at time </a:t>
+                </a:r>
+                <a:r>
+                  <a:rPr lang="en-IE" i="1" dirty="0" smtClean="0"/>
+                  <a:t>t</a:t>
+                </a:r>
+                <a:endParaRPr lang="en-IE" dirty="0" smtClean="0"/>
               </a:p>
               <a:p>
                 <a14:m>
@@ -5521,7 +5895,7 @@
             </p:txBody>
           </p:sp>
         </mc:Choice>
-        <mc:Fallback xmlns="">
+        <mc:Fallback>
           <p:sp>
             <p:nvSpPr>
               <p:cNvPr id="3" name="Content Placeholder 2"/>
@@ -6031,7 +6405,7 @@
         <p:spPr>
           <a:xfrm>
             <a:off x="4561209" y="5630180"/>
-            <a:ext cx="3402676" cy="646331"/>
+            <a:ext cx="3402676" cy="923330"/>
           </a:xfrm>
           <a:prstGeom prst="rect">
             <a:avLst/>
@@ -6057,6 +6431,19 @@
               </a:rPr>
               <a:t>Closed form </a:t>
             </a:r>
+            <a:r>
+              <a:rPr lang="en-IE" b="1" dirty="0" smtClean="0">
+                <a:solidFill>
+                  <a:srgbClr val="FFC000"/>
+                </a:solidFill>
+              </a:rPr>
+              <a:t>– WRONG – SEE LATEXT REPORT</a:t>
+            </a:r>
+            <a:endParaRPr lang="en-IE" b="1" dirty="0" smtClean="0">
+              <a:solidFill>
+                <a:srgbClr val="FFC000"/>
+              </a:solidFill>
+            </a:endParaRPr>
           </a:p>
           <a:p>
             <a:r>
@@ -6087,7 +6474,7 @@
         <p:spPr>
           <a:xfrm flipH="1" flipV="1">
             <a:off x="2882524" y="5363620"/>
-            <a:ext cx="1678685" cy="589726"/>
+            <a:ext cx="1678685" cy="728225"/>
           </a:xfrm>
           <a:prstGeom prst="straightConnector1">
             <a:avLst/>
@@ -6125,7 +6512,7 @@
         <p:spPr>
           <a:xfrm flipV="1">
             <a:off x="7963885" y="5416348"/>
-            <a:ext cx="454137" cy="536998"/>
+            <a:ext cx="454137" cy="675497"/>
           </a:xfrm>
           <a:prstGeom prst="straightConnector1">
             <a:avLst/>

</xml_diff>